<commit_message>
fix for the project reference errors
</commit_message>
<xml_diff>
--- a/vs_solutions/Designer.pptx
+++ b/vs_solutions/Designer.pptx
@@ -6,6 +6,7 @@
   </p:sldMasterIdLst>
   <p:sldIdLst>
     <p:sldId id="256" r:id="rId2"/>
+    <p:sldId id="257" r:id="rId3"/>
   </p:sldIdLst>
   <p:sldSz cx="12192000" cy="6858000"/>
   <p:notesSz cx="6858000" cy="9144000"/>
@@ -104,7 +105,16 @@
       </a:defRPr>
     </a:lvl9pPr>
   </p:defaultTextStyle>
+  <p:extLst>
+    <p:ext uri="{EFAFB233-063F-42B5-8137-9DF3F51BA10A}">
+      <p15:sldGuideLst xmlns:p15="http://schemas.microsoft.com/office/powerpoint/2012/main"/>
+    </p:ext>
+  </p:extLst>
 </p:presentation>
+</file>
+
+<file path=ppt/revisionInfo.xml><?xml version="1.0" encoding="utf-8"?>
+<p1510:revInfo xmlns:a="http://schemas.openxmlformats.org/drawingml/2006/main" xmlns:r="http://schemas.openxmlformats.org/officeDocument/2006/relationships" xmlns:p1510="http://schemas.microsoft.com/office/powerpoint/2015/10/main"/>
 </file>
 
 <file path=ppt/diagrams/colors1.xml><?xml version="1.0" encoding="utf-8"?>
@@ -869,10 +879,9 @@
         <a:lstStyle/>
         <a:p>
           <a:r>
-            <a:rPr lang="en-US" dirty="0" smtClean="0"/>
+            <a:rPr lang="en-US" dirty="0"/>
             <a:t>Bar plot</a:t>
           </a:r>
-          <a:endParaRPr lang="en-US" dirty="0"/>
         </a:p>
       </dgm:t>
     </dgm:pt>
@@ -906,10 +915,9 @@
         <a:lstStyle/>
         <a:p>
           <a:r>
-            <a:rPr lang="en-US" dirty="0" smtClean="0"/>
+            <a:rPr lang="en-US" dirty="0"/>
             <a:t>Distribute Analysis</a:t>
           </a:r>
-          <a:endParaRPr lang="en-US" dirty="0"/>
         </a:p>
       </dgm:t>
     </dgm:pt>
@@ -936,13 +944,16 @@
       </dgm:t>
     </dgm:pt>
     <dgm:pt modelId="{FD76F94E-06EB-47EA-AEBA-71D1AF0A31E9}">
-      <dgm:prSet phldrT="[Text]" phldr="1"/>
+      <dgm:prSet phldrT="[Text]"/>
       <dgm:spPr/>
       <dgm:t>
         <a:bodyPr/>
         <a:lstStyle/>
         <a:p>
-          <a:endParaRPr lang="en-US"/>
+          <a:r>
+            <a:rPr lang="en-US" dirty="0"/>
+            <a:t>KEGG</a:t>
+          </a:r>
         </a:p>
       </dgm:t>
     </dgm:pt>
@@ -1012,13 +1023,6 @@
         </dgm:presLayoutVars>
       </dgm:prSet>
       <dgm:spPr/>
-      <dgm:t>
-        <a:bodyPr/>
-        <a:lstStyle/>
-        <a:p>
-          <a:endParaRPr lang="en-US"/>
-        </a:p>
-      </dgm:t>
     </dgm:pt>
     <dgm:pt modelId="{99C6EE1E-8A7B-4354-BFB1-21A802CAC62F}" type="pres">
       <dgm:prSet presAssocID="{885B4DF1-5E92-4A7A-92E1-249A6788CB20}" presName="spacing" presStyleCnt="0"/>
@@ -1042,13 +1046,13 @@
     </dgm:pt>
   </dgm:ptLst>
   <dgm:cxnLst>
+    <dgm:cxn modelId="{79B1B200-BC0E-495B-92CD-5729E20CFDDC}" type="presOf" srcId="{BC194E55-CA15-4F21-96A5-2833C1CCC222}" destId="{EF273347-7E8E-436B-8A26-0756F6C1CAFE}" srcOrd="0" destOrd="0" presId="urn:microsoft.com/office/officeart/2005/8/layout/vList3"/>
     <dgm:cxn modelId="{8ECCBB10-2D35-44AD-BC56-4745D555C9C3}" srcId="{DFC043FF-DFB8-45A4-BC3A-DAE355B0E179}" destId="{FD76F94E-06EB-47EA-AEBA-71D1AF0A31E9}" srcOrd="2" destOrd="0" parTransId="{B17C6EEB-C6C9-47F4-8C99-BE7D78009BBD}" sibTransId="{56894333-DB57-4E09-9053-D2A588F3AD1D}"/>
+    <dgm:cxn modelId="{2B27D713-1D7E-4D60-AB9F-B356E7AF7262}" type="presOf" srcId="{DFC043FF-DFB8-45A4-BC3A-DAE355B0E179}" destId="{A6A25764-A1F5-4A5D-BB7A-BFE66EC4145E}" srcOrd="0" destOrd="0" presId="urn:microsoft.com/office/officeart/2005/8/layout/vList3"/>
     <dgm:cxn modelId="{362B9E1F-FB47-4ACB-99C5-430650F787CC}" srcId="{DFC043FF-DFB8-45A4-BC3A-DAE355B0E179}" destId="{1E87ACFC-402B-480D-AA1E-A8B0E9DA23CC}" srcOrd="0" destOrd="0" parTransId="{A696B15A-9652-4350-876F-D202A396D22C}" sibTransId="{142B8CF8-A3E2-4DCF-B556-FD7CE58909E3}"/>
-    <dgm:cxn modelId="{79B1B200-BC0E-495B-92CD-5729E20CFDDC}" type="presOf" srcId="{BC194E55-CA15-4F21-96A5-2833C1CCC222}" destId="{EF273347-7E8E-436B-8A26-0756F6C1CAFE}" srcOrd="0" destOrd="0" presId="urn:microsoft.com/office/officeart/2005/8/layout/vList3"/>
+    <dgm:cxn modelId="{DA3ED75A-DA74-42C9-88ED-9B4EF6C36767}" srcId="{DFC043FF-DFB8-45A4-BC3A-DAE355B0E179}" destId="{BC194E55-CA15-4F21-96A5-2833C1CCC222}" srcOrd="1" destOrd="0" parTransId="{ACB36317-2B04-42E0-9E18-D07156A29732}" sibTransId="{885B4DF1-5E92-4A7A-92E1-249A6788CB20}"/>
+    <dgm:cxn modelId="{5EECE7B9-6589-473D-B5E1-40FD8D39F661}" type="presOf" srcId="{1E87ACFC-402B-480D-AA1E-A8B0E9DA23CC}" destId="{EC691D9A-0423-4C0B-A091-F9D96BA0CEC5}" srcOrd="0" destOrd="0" presId="urn:microsoft.com/office/officeart/2005/8/layout/vList3"/>
     <dgm:cxn modelId="{6A4568EC-6C23-4303-AD01-F7CF767BFA73}" type="presOf" srcId="{FD76F94E-06EB-47EA-AEBA-71D1AF0A31E9}" destId="{D960709E-867F-41B2-81CB-ACE0EF3FDB70}" srcOrd="0" destOrd="0" presId="urn:microsoft.com/office/officeart/2005/8/layout/vList3"/>
-    <dgm:cxn modelId="{5EECE7B9-6589-473D-B5E1-40FD8D39F661}" type="presOf" srcId="{1E87ACFC-402B-480D-AA1E-A8B0E9DA23CC}" destId="{EC691D9A-0423-4C0B-A091-F9D96BA0CEC5}" srcOrd="0" destOrd="0" presId="urn:microsoft.com/office/officeart/2005/8/layout/vList3"/>
-    <dgm:cxn modelId="{DA3ED75A-DA74-42C9-88ED-9B4EF6C36767}" srcId="{DFC043FF-DFB8-45A4-BC3A-DAE355B0E179}" destId="{BC194E55-CA15-4F21-96A5-2833C1CCC222}" srcOrd="1" destOrd="0" parTransId="{ACB36317-2B04-42E0-9E18-D07156A29732}" sibTransId="{885B4DF1-5E92-4A7A-92E1-249A6788CB20}"/>
-    <dgm:cxn modelId="{2B27D713-1D7E-4D60-AB9F-B356E7AF7262}" type="presOf" srcId="{DFC043FF-DFB8-45A4-BC3A-DAE355B0E179}" destId="{A6A25764-A1F5-4A5D-BB7A-BFE66EC4145E}" srcOrd="0" destOrd="0" presId="urn:microsoft.com/office/officeart/2005/8/layout/vList3"/>
     <dgm:cxn modelId="{9C65671C-419F-426A-93BC-9102860C7CE4}" type="presParOf" srcId="{A6A25764-A1F5-4A5D-BB7A-BFE66EC4145E}" destId="{8956F73C-9A98-4691-89BB-2AE611716E5F}" srcOrd="0" destOrd="0" presId="urn:microsoft.com/office/officeart/2005/8/layout/vList3"/>
     <dgm:cxn modelId="{A21176CD-DF09-4ABC-93D2-532FA45CA5DF}" type="presParOf" srcId="{8956F73C-9A98-4691-89BB-2AE611716E5F}" destId="{58900302-8500-40FF-8448-E009B22B6FC0}" srcOrd="0" destOrd="0" presId="urn:microsoft.com/office/officeart/2005/8/layout/vList3"/>
     <dgm:cxn modelId="{AF5A439B-021E-4A64-8F28-ECA87C863E4A}" type="presParOf" srcId="{8956F73C-9A98-4691-89BB-2AE611716E5F}" destId="{EC691D9A-0423-4C0B-A091-F9D96BA0CEC5}" srcOrd="1" destOrd="0" presId="urn:microsoft.com/office/officeart/2005/8/layout/vList3"/>
@@ -1161,7 +1165,7 @@
         </a:bodyPr>
         <a:lstStyle/>
         <a:p>
-          <a:pPr lvl="0" algn="ctr" defTabSz="889000">
+          <a:pPr marL="0" lvl="0" indent="0" algn="ctr" defTabSz="889000">
             <a:lnSpc>
               <a:spcPct val="90000"/>
             </a:lnSpc>
@@ -1171,12 +1175,12 @@
             <a:spcAft>
               <a:spcPct val="35000"/>
             </a:spcAft>
+            <a:buNone/>
           </a:pPr>
           <a:r>
-            <a:rPr lang="en-US" sz="2000" kern="1200" dirty="0" smtClean="0"/>
+            <a:rPr lang="en-US" sz="2000" kern="1200" dirty="0"/>
             <a:t>Bar plot</a:t>
           </a:r>
-          <a:endParaRPr lang="en-US" sz="2000" kern="1200" dirty="0"/>
         </a:p>
       </dsp:txBody>
       <dsp:txXfrm rot="10800000">
@@ -1312,7 +1316,7 @@
         </a:bodyPr>
         <a:lstStyle/>
         <a:p>
-          <a:pPr lvl="0" algn="ctr" defTabSz="889000">
+          <a:pPr marL="0" lvl="0" indent="0" algn="ctr" defTabSz="889000">
             <a:lnSpc>
               <a:spcPct val="90000"/>
             </a:lnSpc>
@@ -1322,12 +1326,12 @@
             <a:spcAft>
               <a:spcPct val="35000"/>
             </a:spcAft>
+            <a:buNone/>
           </a:pPr>
           <a:r>
-            <a:rPr lang="en-US" sz="2000" kern="1200" dirty="0" smtClean="0"/>
+            <a:rPr lang="en-US" sz="2000" kern="1200" dirty="0"/>
             <a:t>Distribute Analysis</a:t>
           </a:r>
-          <a:endParaRPr lang="en-US" sz="2000" kern="1200" dirty="0"/>
         </a:p>
       </dsp:txBody>
       <dsp:txXfrm rot="10800000">
@@ -1463,7 +1467,7 @@
         </a:bodyPr>
         <a:lstStyle/>
         <a:p>
-          <a:pPr lvl="0" algn="ctr" defTabSz="889000">
+          <a:pPr marL="0" lvl="0" indent="0" algn="ctr" defTabSz="889000">
             <a:lnSpc>
               <a:spcPct val="90000"/>
             </a:lnSpc>
@@ -1473,8 +1477,12 @@
             <a:spcAft>
               <a:spcPct val="35000"/>
             </a:spcAft>
+            <a:buNone/>
           </a:pPr>
-          <a:endParaRPr lang="en-US" sz="2000" kern="1200"/>
+          <a:r>
+            <a:rPr lang="en-US" sz="2000" kern="1200" dirty="0"/>
+            <a:t>KEGG</a:t>
+          </a:r>
         </a:p>
       </dsp:txBody>
       <dsp:txXfrm rot="10800000">
@@ -2771,10 +2779,9 @@
           </a:lstStyle>
           <a:p>
             <a:r>
-              <a:rPr lang="en-US" smtClean="0"/>
+              <a:rPr lang="en-US"/>
               <a:t>Click to edit Master title style</a:t>
             </a:r>
-            <a:endParaRPr lang="en-US"/>
           </a:p>
         </p:txBody>
       </p:sp>
@@ -2836,10 +2843,9 @@
           </a:lstStyle>
           <a:p>
             <a:r>
-              <a:rPr lang="en-US" smtClean="0"/>
+              <a:rPr lang="en-US"/>
               <a:t>Click to edit Master subtitle style</a:t>
             </a:r>
-            <a:endParaRPr lang="en-US"/>
           </a:p>
         </p:txBody>
       </p:sp>
@@ -2860,7 +2866,7 @@
           <a:p>
             <a:fld id="{CD3856C8-1F6B-45B1-A801-5660F5C1C554}" type="datetimeFigureOut">
               <a:rPr lang="en-US" smtClean="0"/>
-              <a:t>5/26/2017</a:t>
+              <a:t>7/21/2017</a:t>
             </a:fld>
             <a:endParaRPr lang="en-US"/>
           </a:p>
@@ -2954,10 +2960,9 @@
           <a:lstStyle/>
           <a:p>
             <a:r>
-              <a:rPr lang="en-US" smtClean="0"/>
+              <a:rPr lang="en-US"/>
               <a:t>Click to edit Master title style</a:t>
             </a:r>
-            <a:endParaRPr lang="en-US"/>
           </a:p>
         </p:txBody>
       </p:sp>
@@ -2978,38 +2983,37 @@
           <a:p>
             <a:pPr lvl="0"/>
             <a:r>
-              <a:rPr lang="en-US" smtClean="0"/>
+              <a:rPr lang="en-US"/>
               <a:t>Edit Master text styles</a:t>
             </a:r>
           </a:p>
           <a:p>
             <a:pPr lvl="1"/>
             <a:r>
-              <a:rPr lang="en-US" smtClean="0"/>
+              <a:rPr lang="en-US"/>
               <a:t>Second level</a:t>
             </a:r>
           </a:p>
           <a:p>
             <a:pPr lvl="2"/>
             <a:r>
-              <a:rPr lang="en-US" smtClean="0"/>
+              <a:rPr lang="en-US"/>
               <a:t>Third level</a:t>
             </a:r>
           </a:p>
           <a:p>
             <a:pPr lvl="3"/>
             <a:r>
-              <a:rPr lang="en-US" smtClean="0"/>
+              <a:rPr lang="en-US"/>
               <a:t>Fourth level</a:t>
             </a:r>
           </a:p>
           <a:p>
             <a:pPr lvl="4"/>
             <a:r>
-              <a:rPr lang="en-US" smtClean="0"/>
+              <a:rPr lang="en-US"/>
               <a:t>Fifth level</a:t>
             </a:r>
-            <a:endParaRPr lang="en-US"/>
           </a:p>
         </p:txBody>
       </p:sp>
@@ -3030,7 +3034,7 @@
           <a:p>
             <a:fld id="{CD3856C8-1F6B-45B1-A801-5660F5C1C554}" type="datetimeFigureOut">
               <a:rPr lang="en-US" smtClean="0"/>
-              <a:t>5/26/2017</a:t>
+              <a:t>7/21/2017</a:t>
             </a:fld>
             <a:endParaRPr lang="en-US"/>
           </a:p>
@@ -3129,10 +3133,9 @@
           <a:lstStyle/>
           <a:p>
             <a:r>
-              <a:rPr lang="en-US" smtClean="0"/>
+              <a:rPr lang="en-US"/>
               <a:t>Click to edit Master title style</a:t>
             </a:r>
-            <a:endParaRPr lang="en-US"/>
           </a:p>
         </p:txBody>
       </p:sp>
@@ -3158,38 +3161,37 @@
           <a:p>
             <a:pPr lvl="0"/>
             <a:r>
-              <a:rPr lang="en-US" smtClean="0"/>
+              <a:rPr lang="en-US"/>
               <a:t>Edit Master text styles</a:t>
             </a:r>
           </a:p>
           <a:p>
             <a:pPr lvl="1"/>
             <a:r>
-              <a:rPr lang="en-US" smtClean="0"/>
+              <a:rPr lang="en-US"/>
               <a:t>Second level</a:t>
             </a:r>
           </a:p>
           <a:p>
             <a:pPr lvl="2"/>
             <a:r>
-              <a:rPr lang="en-US" smtClean="0"/>
+              <a:rPr lang="en-US"/>
               <a:t>Third level</a:t>
             </a:r>
           </a:p>
           <a:p>
             <a:pPr lvl="3"/>
             <a:r>
-              <a:rPr lang="en-US" smtClean="0"/>
+              <a:rPr lang="en-US"/>
               <a:t>Fourth level</a:t>
             </a:r>
           </a:p>
           <a:p>
             <a:pPr lvl="4"/>
             <a:r>
-              <a:rPr lang="en-US" smtClean="0"/>
+              <a:rPr lang="en-US"/>
               <a:t>Fifth level</a:t>
             </a:r>
-            <a:endParaRPr lang="en-US"/>
           </a:p>
         </p:txBody>
       </p:sp>
@@ -3210,7 +3212,7 @@
           <a:p>
             <a:fld id="{CD3856C8-1F6B-45B1-A801-5660F5C1C554}" type="datetimeFigureOut">
               <a:rPr lang="en-US" smtClean="0"/>
-              <a:t>5/26/2017</a:t>
+              <a:t>7/21/2017</a:t>
             </a:fld>
             <a:endParaRPr lang="en-US"/>
           </a:p>
@@ -3304,10 +3306,9 @@
           <a:lstStyle/>
           <a:p>
             <a:r>
-              <a:rPr lang="en-US" smtClean="0"/>
+              <a:rPr lang="en-US"/>
               <a:t>Click to edit Master title style</a:t>
             </a:r>
-            <a:endParaRPr lang="en-US"/>
           </a:p>
         </p:txBody>
       </p:sp>
@@ -3328,38 +3329,37 @@
           <a:p>
             <a:pPr lvl="0"/>
             <a:r>
-              <a:rPr lang="en-US" smtClean="0"/>
+              <a:rPr lang="en-US"/>
               <a:t>Edit Master text styles</a:t>
             </a:r>
           </a:p>
           <a:p>
             <a:pPr lvl="1"/>
             <a:r>
-              <a:rPr lang="en-US" smtClean="0"/>
+              <a:rPr lang="en-US"/>
               <a:t>Second level</a:t>
             </a:r>
           </a:p>
           <a:p>
             <a:pPr lvl="2"/>
             <a:r>
-              <a:rPr lang="en-US" smtClean="0"/>
+              <a:rPr lang="en-US"/>
               <a:t>Third level</a:t>
             </a:r>
           </a:p>
           <a:p>
             <a:pPr lvl="3"/>
             <a:r>
-              <a:rPr lang="en-US" smtClean="0"/>
+              <a:rPr lang="en-US"/>
               <a:t>Fourth level</a:t>
             </a:r>
           </a:p>
           <a:p>
             <a:pPr lvl="4"/>
             <a:r>
-              <a:rPr lang="en-US" smtClean="0"/>
+              <a:rPr lang="en-US"/>
               <a:t>Fifth level</a:t>
             </a:r>
-            <a:endParaRPr lang="en-US"/>
           </a:p>
         </p:txBody>
       </p:sp>
@@ -3380,7 +3380,7 @@
           <a:p>
             <a:fld id="{CD3856C8-1F6B-45B1-A801-5660F5C1C554}" type="datetimeFigureOut">
               <a:rPr lang="en-US" smtClean="0"/>
-              <a:t>5/26/2017</a:t>
+              <a:t>7/21/2017</a:t>
             </a:fld>
             <a:endParaRPr lang="en-US"/>
           </a:p>
@@ -3483,10 +3483,9 @@
           </a:lstStyle>
           <a:p>
             <a:r>
-              <a:rPr lang="en-US" smtClean="0"/>
+              <a:rPr lang="en-US"/>
               <a:t>Click to edit Master title style</a:t>
             </a:r>
-            <a:endParaRPr lang="en-US"/>
           </a:p>
         </p:txBody>
       </p:sp>
@@ -3603,7 +3602,7 @@
           <a:p>
             <a:pPr lvl="0"/>
             <a:r>
-              <a:rPr lang="en-US" smtClean="0"/>
+              <a:rPr lang="en-US"/>
               <a:t>Edit Master text styles</a:t>
             </a:r>
           </a:p>
@@ -3626,7 +3625,7 @@
           <a:p>
             <a:fld id="{CD3856C8-1F6B-45B1-A801-5660F5C1C554}" type="datetimeFigureOut">
               <a:rPr lang="en-US" smtClean="0"/>
-              <a:t>5/26/2017</a:t>
+              <a:t>7/21/2017</a:t>
             </a:fld>
             <a:endParaRPr lang="en-US"/>
           </a:p>
@@ -3720,10 +3719,9 @@
           <a:lstStyle/>
           <a:p>
             <a:r>
-              <a:rPr lang="en-US" smtClean="0"/>
+              <a:rPr lang="en-US"/>
               <a:t>Click to edit Master title style</a:t>
             </a:r>
-            <a:endParaRPr lang="en-US"/>
           </a:p>
         </p:txBody>
       </p:sp>
@@ -3749,38 +3747,37 @@
           <a:p>
             <a:pPr lvl="0"/>
             <a:r>
-              <a:rPr lang="en-US" smtClean="0"/>
+              <a:rPr lang="en-US"/>
               <a:t>Edit Master text styles</a:t>
             </a:r>
           </a:p>
           <a:p>
             <a:pPr lvl="1"/>
             <a:r>
-              <a:rPr lang="en-US" smtClean="0"/>
+              <a:rPr lang="en-US"/>
               <a:t>Second level</a:t>
             </a:r>
           </a:p>
           <a:p>
             <a:pPr lvl="2"/>
             <a:r>
-              <a:rPr lang="en-US" smtClean="0"/>
+              <a:rPr lang="en-US"/>
               <a:t>Third level</a:t>
             </a:r>
           </a:p>
           <a:p>
             <a:pPr lvl="3"/>
             <a:r>
-              <a:rPr lang="en-US" smtClean="0"/>
+              <a:rPr lang="en-US"/>
               <a:t>Fourth level</a:t>
             </a:r>
           </a:p>
           <a:p>
             <a:pPr lvl="4"/>
             <a:r>
-              <a:rPr lang="en-US" smtClean="0"/>
+              <a:rPr lang="en-US"/>
               <a:t>Fifth level</a:t>
             </a:r>
-            <a:endParaRPr lang="en-US"/>
           </a:p>
         </p:txBody>
       </p:sp>
@@ -3806,38 +3803,37 @@
           <a:p>
             <a:pPr lvl="0"/>
             <a:r>
-              <a:rPr lang="en-US" smtClean="0"/>
+              <a:rPr lang="en-US"/>
               <a:t>Edit Master text styles</a:t>
             </a:r>
           </a:p>
           <a:p>
             <a:pPr lvl="1"/>
             <a:r>
-              <a:rPr lang="en-US" smtClean="0"/>
+              <a:rPr lang="en-US"/>
               <a:t>Second level</a:t>
             </a:r>
           </a:p>
           <a:p>
             <a:pPr lvl="2"/>
             <a:r>
-              <a:rPr lang="en-US" smtClean="0"/>
+              <a:rPr lang="en-US"/>
               <a:t>Third level</a:t>
             </a:r>
           </a:p>
           <a:p>
             <a:pPr lvl="3"/>
             <a:r>
-              <a:rPr lang="en-US" smtClean="0"/>
+              <a:rPr lang="en-US"/>
               <a:t>Fourth level</a:t>
             </a:r>
           </a:p>
           <a:p>
             <a:pPr lvl="4"/>
             <a:r>
-              <a:rPr lang="en-US" smtClean="0"/>
+              <a:rPr lang="en-US"/>
               <a:t>Fifth level</a:t>
             </a:r>
-            <a:endParaRPr lang="en-US"/>
           </a:p>
         </p:txBody>
       </p:sp>
@@ -3858,7 +3854,7 @@
           <a:p>
             <a:fld id="{CD3856C8-1F6B-45B1-A801-5660F5C1C554}" type="datetimeFigureOut">
               <a:rPr lang="en-US" smtClean="0"/>
-              <a:t>5/26/2017</a:t>
+              <a:t>7/21/2017</a:t>
             </a:fld>
             <a:endParaRPr lang="en-US"/>
           </a:p>
@@ -3957,10 +3953,9 @@
           <a:lstStyle/>
           <a:p>
             <a:r>
-              <a:rPr lang="en-US" smtClean="0"/>
+              <a:rPr lang="en-US"/>
               <a:t>Click to edit Master title style</a:t>
             </a:r>
-            <a:endParaRPr lang="en-US"/>
           </a:p>
         </p:txBody>
       </p:sp>
@@ -4023,7 +4018,7 @@
           <a:p>
             <a:pPr lvl="0"/>
             <a:r>
-              <a:rPr lang="en-US" smtClean="0"/>
+              <a:rPr lang="en-US"/>
               <a:t>Edit Master text styles</a:t>
             </a:r>
           </a:p>
@@ -4051,38 +4046,37 @@
           <a:p>
             <a:pPr lvl="0"/>
             <a:r>
-              <a:rPr lang="en-US" smtClean="0"/>
+              <a:rPr lang="en-US"/>
               <a:t>Edit Master text styles</a:t>
             </a:r>
           </a:p>
           <a:p>
             <a:pPr lvl="1"/>
             <a:r>
-              <a:rPr lang="en-US" smtClean="0"/>
+              <a:rPr lang="en-US"/>
               <a:t>Second level</a:t>
             </a:r>
           </a:p>
           <a:p>
             <a:pPr lvl="2"/>
             <a:r>
-              <a:rPr lang="en-US" smtClean="0"/>
+              <a:rPr lang="en-US"/>
               <a:t>Third level</a:t>
             </a:r>
           </a:p>
           <a:p>
             <a:pPr lvl="3"/>
             <a:r>
-              <a:rPr lang="en-US" smtClean="0"/>
+              <a:rPr lang="en-US"/>
               <a:t>Fourth level</a:t>
             </a:r>
           </a:p>
           <a:p>
             <a:pPr lvl="4"/>
             <a:r>
-              <a:rPr lang="en-US" smtClean="0"/>
+              <a:rPr lang="en-US"/>
               <a:t>Fifth level</a:t>
             </a:r>
-            <a:endParaRPr lang="en-US"/>
           </a:p>
         </p:txBody>
       </p:sp>
@@ -4145,7 +4139,7 @@
           <a:p>
             <a:pPr lvl="0"/>
             <a:r>
-              <a:rPr lang="en-US" smtClean="0"/>
+              <a:rPr lang="en-US"/>
               <a:t>Edit Master text styles</a:t>
             </a:r>
           </a:p>
@@ -4173,38 +4167,37 @@
           <a:p>
             <a:pPr lvl="0"/>
             <a:r>
-              <a:rPr lang="en-US" smtClean="0"/>
+              <a:rPr lang="en-US"/>
               <a:t>Edit Master text styles</a:t>
             </a:r>
           </a:p>
           <a:p>
             <a:pPr lvl="1"/>
             <a:r>
-              <a:rPr lang="en-US" smtClean="0"/>
+              <a:rPr lang="en-US"/>
               <a:t>Second level</a:t>
             </a:r>
           </a:p>
           <a:p>
             <a:pPr lvl="2"/>
             <a:r>
-              <a:rPr lang="en-US" smtClean="0"/>
+              <a:rPr lang="en-US"/>
               <a:t>Third level</a:t>
             </a:r>
           </a:p>
           <a:p>
             <a:pPr lvl="3"/>
             <a:r>
-              <a:rPr lang="en-US" smtClean="0"/>
+              <a:rPr lang="en-US"/>
               <a:t>Fourth level</a:t>
             </a:r>
           </a:p>
           <a:p>
             <a:pPr lvl="4"/>
             <a:r>
-              <a:rPr lang="en-US" smtClean="0"/>
+              <a:rPr lang="en-US"/>
               <a:t>Fifth level</a:t>
             </a:r>
-            <a:endParaRPr lang="en-US"/>
           </a:p>
         </p:txBody>
       </p:sp>
@@ -4225,7 +4218,7 @@
           <a:p>
             <a:fld id="{CD3856C8-1F6B-45B1-A801-5660F5C1C554}" type="datetimeFigureOut">
               <a:rPr lang="en-US" smtClean="0"/>
-              <a:t>5/26/2017</a:t>
+              <a:t>7/21/2017</a:t>
             </a:fld>
             <a:endParaRPr lang="en-US"/>
           </a:p>
@@ -4319,10 +4312,9 @@
           <a:lstStyle/>
           <a:p>
             <a:r>
-              <a:rPr lang="en-US" smtClean="0"/>
+              <a:rPr lang="en-US"/>
               <a:t>Click to edit Master title style</a:t>
             </a:r>
-            <a:endParaRPr lang="en-US"/>
           </a:p>
         </p:txBody>
       </p:sp>
@@ -4343,7 +4335,7 @@
           <a:p>
             <a:fld id="{CD3856C8-1F6B-45B1-A801-5660F5C1C554}" type="datetimeFigureOut">
               <a:rPr lang="en-US" smtClean="0"/>
-              <a:t>5/26/2017</a:t>
+              <a:t>7/21/2017</a:t>
             </a:fld>
             <a:endParaRPr lang="en-US"/>
           </a:p>
@@ -4438,7 +4430,7 @@
           <a:p>
             <a:fld id="{CD3856C8-1F6B-45B1-A801-5660F5C1C554}" type="datetimeFigureOut">
               <a:rPr lang="en-US" smtClean="0"/>
-              <a:t>5/26/2017</a:t>
+              <a:t>7/21/2017</a:t>
             </a:fld>
             <a:endParaRPr lang="en-US"/>
           </a:p>
@@ -4541,10 +4533,9 @@
           </a:lstStyle>
           <a:p>
             <a:r>
-              <a:rPr lang="en-US" smtClean="0"/>
+              <a:rPr lang="en-US"/>
               <a:t>Click to edit Master title style</a:t>
             </a:r>
-            <a:endParaRPr lang="en-US"/>
           </a:p>
         </p:txBody>
       </p:sp>
@@ -4598,38 +4589,37 @@
           <a:p>
             <a:pPr lvl="0"/>
             <a:r>
-              <a:rPr lang="en-US" smtClean="0"/>
+              <a:rPr lang="en-US"/>
               <a:t>Edit Master text styles</a:t>
             </a:r>
           </a:p>
           <a:p>
             <a:pPr lvl="1"/>
             <a:r>
-              <a:rPr lang="en-US" smtClean="0"/>
+              <a:rPr lang="en-US"/>
               <a:t>Second level</a:t>
             </a:r>
           </a:p>
           <a:p>
             <a:pPr lvl="2"/>
             <a:r>
-              <a:rPr lang="en-US" smtClean="0"/>
+              <a:rPr lang="en-US"/>
               <a:t>Third level</a:t>
             </a:r>
           </a:p>
           <a:p>
             <a:pPr lvl="3"/>
             <a:r>
-              <a:rPr lang="en-US" smtClean="0"/>
+              <a:rPr lang="en-US"/>
               <a:t>Fourth level</a:t>
             </a:r>
           </a:p>
           <a:p>
             <a:pPr lvl="4"/>
             <a:r>
-              <a:rPr lang="en-US" smtClean="0"/>
+              <a:rPr lang="en-US"/>
               <a:t>Fifth level</a:t>
             </a:r>
-            <a:endParaRPr lang="en-US"/>
           </a:p>
         </p:txBody>
       </p:sp>
@@ -4692,7 +4682,7 @@
           <a:p>
             <a:pPr lvl="0"/>
             <a:r>
-              <a:rPr lang="en-US" smtClean="0"/>
+              <a:rPr lang="en-US"/>
               <a:t>Edit Master text styles</a:t>
             </a:r>
           </a:p>
@@ -4715,7 +4705,7 @@
           <a:p>
             <a:fld id="{CD3856C8-1F6B-45B1-A801-5660F5C1C554}" type="datetimeFigureOut">
               <a:rPr lang="en-US" smtClean="0"/>
-              <a:t>5/26/2017</a:t>
+              <a:t>7/21/2017</a:t>
             </a:fld>
             <a:endParaRPr lang="en-US"/>
           </a:p>
@@ -4818,10 +4808,9 @@
           </a:lstStyle>
           <a:p>
             <a:r>
-              <a:rPr lang="en-US" smtClean="0"/>
+              <a:rPr lang="en-US"/>
               <a:t>Click to edit Master title style</a:t>
             </a:r>
-            <a:endParaRPr lang="en-US"/>
           </a:p>
         </p:txBody>
       </p:sp>
@@ -4945,7 +4934,7 @@
           <a:p>
             <a:pPr lvl="0"/>
             <a:r>
-              <a:rPr lang="en-US" smtClean="0"/>
+              <a:rPr lang="en-US"/>
               <a:t>Edit Master text styles</a:t>
             </a:r>
           </a:p>
@@ -4968,7 +4957,7 @@
           <a:p>
             <a:fld id="{CD3856C8-1F6B-45B1-A801-5660F5C1C554}" type="datetimeFigureOut">
               <a:rPr lang="en-US" smtClean="0"/>
-              <a:t>5/26/2017</a:t>
+              <a:t>7/21/2017</a:t>
             </a:fld>
             <a:endParaRPr lang="en-US"/>
           </a:p>
@@ -5077,10 +5066,9 @@
           <a:lstStyle/>
           <a:p>
             <a:r>
-              <a:rPr lang="en-US" smtClean="0"/>
+              <a:rPr lang="en-US"/>
               <a:t>Click to edit Master title style</a:t>
             </a:r>
-            <a:endParaRPr lang="en-US"/>
           </a:p>
         </p:txBody>
       </p:sp>
@@ -5111,38 +5099,37 @@
           <a:p>
             <a:pPr lvl="0"/>
             <a:r>
-              <a:rPr lang="en-US" smtClean="0"/>
+              <a:rPr lang="en-US"/>
               <a:t>Edit Master text styles</a:t>
             </a:r>
           </a:p>
           <a:p>
             <a:pPr lvl="1"/>
             <a:r>
-              <a:rPr lang="en-US" smtClean="0"/>
+              <a:rPr lang="en-US"/>
               <a:t>Second level</a:t>
             </a:r>
           </a:p>
           <a:p>
             <a:pPr lvl="2"/>
             <a:r>
-              <a:rPr lang="en-US" smtClean="0"/>
+              <a:rPr lang="en-US"/>
               <a:t>Third level</a:t>
             </a:r>
           </a:p>
           <a:p>
             <a:pPr lvl="3"/>
             <a:r>
-              <a:rPr lang="en-US" smtClean="0"/>
+              <a:rPr lang="en-US"/>
               <a:t>Fourth level</a:t>
             </a:r>
           </a:p>
           <a:p>
             <a:pPr lvl="4"/>
             <a:r>
-              <a:rPr lang="en-US" smtClean="0"/>
+              <a:rPr lang="en-US"/>
               <a:t>Fifth level</a:t>
             </a:r>
-            <a:endParaRPr lang="en-US"/>
           </a:p>
         </p:txBody>
       </p:sp>
@@ -5181,7 +5168,7 @@
           <a:p>
             <a:fld id="{CD3856C8-1F6B-45B1-A801-5660F5C1C554}" type="datetimeFigureOut">
               <a:rPr lang="en-US" smtClean="0"/>
-              <a:t>5/26/2017</a:t>
+              <a:t>7/21/2017</a:t>
             </a:fld>
             <a:endParaRPr lang="en-US"/>
           </a:p>
@@ -5602,11 +5589,11 @@
           <a:lstStyle/>
           <a:p>
             <a:r>
-              <a:rPr lang="en-US" dirty="0" smtClean="0"/>
+              <a:rPr lang="en-US" dirty="0"/>
               <a:t>COG </a:t>
             </a:r>
             <a:r>
-              <a:rPr lang="en-US" dirty="0" err="1" smtClean="0"/>
+              <a:rPr lang="en-US" dirty="0" err="1"/>
               <a:t>myva</a:t>
             </a:r>
             <a:endParaRPr lang="en-US" dirty="0"/>
@@ -5634,7 +5621,7 @@
             <p:nvPr>
               <p:extLst>
                 <p:ext uri="{D42A27DB-BD31-4B8C-83A1-F6EECF244321}">
-                  <p14:modId xmlns:p14="http://schemas.microsoft.com/office/powerpoint/2010/main" val="217142230"/>
+                  <p14:modId xmlns:p14="http://schemas.microsoft.com/office/powerpoint/2010/main" val="2046090826"/>
                 </p:ext>
               </p:extLst>
             </p:nvPr>
@@ -5684,10 +5671,9 @@
             <a:p>
               <a:pPr algn="ctr"/>
               <a:r>
-                <a:rPr lang="en-US" dirty="0" smtClean="0"/>
+                <a:rPr lang="en-US" dirty="0"/>
                 <a:t>Protein Fasta</a:t>
               </a:r>
-              <a:endParaRPr lang="en-US" dirty="0"/>
             </a:p>
           </p:txBody>
         </p:sp>
@@ -5753,17 +5739,12 @@
             <a:p>
               <a:r>
                 <a:rPr lang="en-US" dirty="0" err="1"/>
-                <a:t>l</a:t>
+                <a:t>localblast</a:t>
               </a:r>
               <a:r>
-                <a:rPr lang="en-US" dirty="0" err="1" smtClean="0"/>
-                <a:t>ocalblast</a:t>
-              </a:r>
-              <a:r>
-                <a:rPr lang="en-US" dirty="0" smtClean="0"/>
+                <a:rPr lang="en-US" dirty="0"/>
                 <a:t>+</a:t>
               </a:r>
-              <a:endParaRPr lang="en-US" dirty="0"/>
             </a:p>
           </p:txBody>
         </p:sp>
@@ -5802,7 +5783,7 @@
             <a:p>
               <a:pPr algn="ctr"/>
               <a:r>
-                <a:rPr lang="en-US" dirty="0" err="1" smtClean="0"/>
+                <a:rPr lang="en-US" dirty="0" err="1"/>
                 <a:t>Besthit</a:t>
               </a:r>
               <a:endParaRPr lang="en-US" dirty="0"/>
@@ -5844,14 +5825,13 @@
             <a:p>
               <a:pPr algn="ctr"/>
               <a:r>
-                <a:rPr lang="en-US" dirty="0" err="1" smtClean="0"/>
+                <a:rPr lang="en-US" dirty="0" err="1"/>
                 <a:t>COG_myva</a:t>
               </a:r>
               <a:r>
-                <a:rPr lang="en-US" dirty="0" smtClean="0"/>
+                <a:rPr lang="en-US" dirty="0"/>
                 <a:t> database</a:t>
               </a:r>
-              <a:endParaRPr lang="en-US" dirty="0"/>
             </a:p>
           </p:txBody>
         </p:sp>
@@ -5890,10 +5870,9 @@
             <a:p>
               <a:pPr algn="ctr"/>
               <a:r>
-                <a:rPr lang="en-US" dirty="0" smtClean="0"/>
+                <a:rPr lang="en-US" dirty="0"/>
                 <a:t>COG mapping</a:t>
               </a:r>
-              <a:endParaRPr lang="en-US" dirty="0"/>
             </a:p>
           </p:txBody>
         </p:sp>
@@ -5970,14 +5949,13 @@
             <a:p>
               <a:pPr algn="ctr"/>
               <a:r>
-                <a:rPr lang="en-US" dirty="0" err="1" smtClean="0"/>
+                <a:rPr lang="en-US" dirty="0" err="1"/>
                 <a:t>Whog</a:t>
               </a:r>
               <a:r>
-                <a:rPr lang="en-US" dirty="0" smtClean="0"/>
+                <a:rPr lang="en-US" dirty="0"/>
                 <a:t> assign</a:t>
               </a:r>
-              <a:endParaRPr lang="en-US" dirty="0"/>
             </a:p>
           </p:txBody>
         </p:sp>
@@ -6024,6 +6002,124 @@
     <p:extLst>
       <p:ext uri="{BB962C8B-B14F-4D97-AF65-F5344CB8AC3E}">
         <p14:creationId xmlns:p14="http://schemas.microsoft.com/office/powerpoint/2010/main" val="425367502"/>
+      </p:ext>
+    </p:extLst>
+  </p:cSld>
+  <p:clrMapOvr>
+    <a:masterClrMapping/>
+  </p:clrMapOvr>
+</p:sld>
+</file>
+
+<file path=ppt/slides/slide2.xml><?xml version="1.0" encoding="utf-8"?>
+<p:sld xmlns:a="http://schemas.openxmlformats.org/drawingml/2006/main" xmlns:r="http://schemas.openxmlformats.org/officeDocument/2006/relationships" xmlns:p="http://schemas.openxmlformats.org/presentationml/2006/main">
+  <p:cSld>
+    <p:spTree>
+      <p:nvGrpSpPr>
+        <p:cNvPr id="1" name=""/>
+        <p:cNvGrpSpPr/>
+        <p:nvPr/>
+      </p:nvGrpSpPr>
+      <p:grpSpPr>
+        <a:xfrm>
+          <a:off x="0" y="0"/>
+          <a:ext cx="0" cy="0"/>
+          <a:chOff x="0" y="0"/>
+          <a:chExt cx="0" cy="0"/>
+        </a:xfrm>
+      </p:grpSpPr>
+      <p:sp>
+        <p:nvSpPr>
+          <p:cNvPr id="4" name="矩形 3">
+            <a:extLst>
+              <a:ext uri="{FF2B5EF4-FFF2-40B4-BE49-F238E27FC236}">
+                <a16:creationId xmlns:a16="http://schemas.microsoft.com/office/drawing/2014/main" id="{BD06234D-04E0-4EDA-B258-B4FF9A926B37}"/>
+              </a:ext>
+            </a:extLst>
+          </p:cNvPr>
+          <p:cNvSpPr/>
+          <p:nvPr/>
+        </p:nvSpPr>
+        <p:spPr>
+          <a:xfrm>
+            <a:off x="626301" y="676405"/>
+            <a:ext cx="1653436" cy="695195"/>
+          </a:xfrm>
+          <a:prstGeom prst="rect">
+            <a:avLst/>
+          </a:prstGeom>
+        </p:spPr>
+        <p:style>
+          <a:lnRef idx="0">
+            <a:schemeClr val="accent6"/>
+          </a:lnRef>
+          <a:fillRef idx="3">
+            <a:schemeClr val="accent6"/>
+          </a:fillRef>
+          <a:effectRef idx="3">
+            <a:schemeClr val="accent6"/>
+          </a:effectRef>
+          <a:fontRef idx="minor">
+            <a:schemeClr val="lt1"/>
+          </a:fontRef>
+        </p:style>
+        <p:txBody>
+          <a:bodyPr rtlCol="0" anchor="ctr"/>
+          <a:lstStyle/>
+          <a:p>
+            <a:pPr algn="ctr"/>
+            <a:endParaRPr lang="zh-CN" altLang="en-US"/>
+          </a:p>
+        </p:txBody>
+      </p:sp>
+      <p:sp>
+        <p:nvSpPr>
+          <p:cNvPr id="5" name="矩形 4">
+            <a:extLst>
+              <a:ext uri="{FF2B5EF4-FFF2-40B4-BE49-F238E27FC236}">
+                <a16:creationId xmlns:a16="http://schemas.microsoft.com/office/drawing/2014/main" id="{6D3821A3-C8B3-4D58-87E3-29679C69CF51}"/>
+              </a:ext>
+            </a:extLst>
+          </p:cNvPr>
+          <p:cNvSpPr/>
+          <p:nvPr/>
+        </p:nvSpPr>
+        <p:spPr>
+          <a:xfrm>
+            <a:off x="626301" y="2300613"/>
+            <a:ext cx="1653436" cy="695195"/>
+          </a:xfrm>
+          <a:prstGeom prst="rect">
+            <a:avLst/>
+          </a:prstGeom>
+        </p:spPr>
+        <p:style>
+          <a:lnRef idx="0">
+            <a:schemeClr val="accent6"/>
+          </a:lnRef>
+          <a:fillRef idx="3">
+            <a:schemeClr val="accent6"/>
+          </a:fillRef>
+          <a:effectRef idx="3">
+            <a:schemeClr val="accent6"/>
+          </a:effectRef>
+          <a:fontRef idx="minor">
+            <a:schemeClr val="lt1"/>
+          </a:fontRef>
+        </p:style>
+        <p:txBody>
+          <a:bodyPr rtlCol="0" anchor="ctr"/>
+          <a:lstStyle/>
+          <a:p>
+            <a:pPr algn="ctr"/>
+            <a:endParaRPr lang="zh-CN" altLang="en-US"/>
+          </a:p>
+        </p:txBody>
+      </p:sp>
+    </p:spTree>
+    <p:extLst>
+      <p:ext uri="{BB962C8B-B14F-4D97-AF65-F5344CB8AC3E}">
+        <p14:creationId xmlns:p14="http://schemas.microsoft.com/office/powerpoint/2010/main" val="1669720218"/>
       </p:ext>
     </p:extLst>
   </p:cSld>

</xml_diff>